<commit_message>
update ppt to include asynchronous example
</commit_message>
<xml_diff>
--- a/Node.Js Development.pptx
+++ b/Node.Js Development.pptx
@@ -5,7 +5,7 @@
     <p:sldMasterId id="2147483648" r:id="rId1"/>
   </p:sldMasterIdLst>
   <p:notesMasterIdLst>
-    <p:notesMasterId r:id="rId7"/>
+    <p:notesMasterId r:id="rId8"/>
   </p:notesMasterIdLst>
   <p:sldIdLst>
     <p:sldId id="256" r:id="rId2"/>
@@ -13,6 +13,7 @@
     <p:sldId id="258" r:id="rId4"/>
     <p:sldId id="259" r:id="rId5"/>
     <p:sldId id="260" r:id="rId6"/>
+    <p:sldId id="261" r:id="rId7"/>
   </p:sldIdLst>
   <p:sldSz cx="12192000" cy="6858000"/>
   <p:notesSz cx="6858000" cy="9144000"/>
@@ -111,6 +112,11 @@
       </a:defRPr>
     </a:lvl9pPr>
   </p:defaultTextStyle>
+  <p:extLst>
+    <p:ext uri="{EFAFB233-063F-42B5-8137-9DF3F51BA10A}">
+      <p15:sldGuideLst xmlns:p15="http://schemas.microsoft.com/office/powerpoint/2012/main"/>
+    </p:ext>
+  </p:extLst>
 </p:presentation>
 </file>
 
@@ -6226,7 +6232,7 @@
           <a:p>
             <a:fld id="{D988F593-55D3-4322-A136-4A3C64F20FCD}" type="datetimeFigureOut">
               <a:rPr lang="en-US" smtClean="0"/>
-              <a:t>4/15/2020</a:t>
+              <a:t>5/6/2020</a:t>
             </a:fld>
             <a:endParaRPr lang="en-US"/>
           </a:p>
@@ -6661,6 +6667,90 @@
 </p:notes>
 </file>
 
+<file path=ppt/notesSlides/notesSlide3.xml><?xml version="1.0" encoding="utf-8"?>
+<p:notes xmlns:a="http://schemas.openxmlformats.org/drawingml/2006/main" xmlns:r="http://schemas.openxmlformats.org/officeDocument/2006/relationships" xmlns:p="http://schemas.openxmlformats.org/presentationml/2006/main">
+  <p:cSld>
+    <p:spTree>
+      <p:nvGrpSpPr>
+        <p:cNvPr id="1" name=""/>
+        <p:cNvGrpSpPr/>
+        <p:nvPr/>
+      </p:nvGrpSpPr>
+      <p:grpSpPr>
+        <a:xfrm>
+          <a:off x="0" y="0"/>
+          <a:ext cx="0" cy="0"/>
+          <a:chOff x="0" y="0"/>
+          <a:chExt cx="0" cy="0"/>
+        </a:xfrm>
+      </p:grpSpPr>
+      <p:sp>
+        <p:nvSpPr>
+          <p:cNvPr id="2" name="Slide Image Placeholder 1"/>
+          <p:cNvSpPr>
+            <a:spLocks noGrp="1" noRot="1" noChangeAspect="1"/>
+          </p:cNvSpPr>
+          <p:nvPr>
+            <p:ph type="sldImg"/>
+          </p:nvPr>
+        </p:nvSpPr>
+        <p:spPr/>
+      </p:sp>
+      <p:sp>
+        <p:nvSpPr>
+          <p:cNvPr id="3" name="Notes Placeholder 2"/>
+          <p:cNvSpPr>
+            <a:spLocks noGrp="1"/>
+          </p:cNvSpPr>
+          <p:nvPr>
+            <p:ph type="body" idx="1"/>
+          </p:nvPr>
+        </p:nvSpPr>
+        <p:spPr/>
+        <p:txBody>
+          <a:bodyPr/>
+          <a:lstStyle/>
+          <a:p>
+            <a:endParaRPr lang="en-US" dirty="0"/>
+          </a:p>
+        </p:txBody>
+      </p:sp>
+      <p:sp>
+        <p:nvSpPr>
+          <p:cNvPr id="4" name="Slide Number Placeholder 3"/>
+          <p:cNvSpPr>
+            <a:spLocks noGrp="1"/>
+          </p:cNvSpPr>
+          <p:nvPr>
+            <p:ph type="sldNum" sz="quarter" idx="5"/>
+          </p:nvPr>
+        </p:nvSpPr>
+        <p:spPr/>
+        <p:txBody>
+          <a:bodyPr/>
+          <a:lstStyle/>
+          <a:p>
+            <a:fld id="{565C4653-0072-4F65-81BD-21F3EFA30F4A}" type="slidenum">
+              <a:rPr lang="en-US" smtClean="0"/>
+              <a:t>6</a:t>
+            </a:fld>
+            <a:endParaRPr lang="en-US"/>
+          </a:p>
+        </p:txBody>
+      </p:sp>
+    </p:spTree>
+    <p:extLst>
+      <p:ext uri="{BB962C8B-B14F-4D97-AF65-F5344CB8AC3E}">
+        <p14:creationId xmlns:p14="http://schemas.microsoft.com/office/powerpoint/2010/main" val="1464975695"/>
+      </p:ext>
+    </p:extLst>
+  </p:cSld>
+  <p:clrMapOvr>
+    <a:masterClrMapping/>
+  </p:clrMapOvr>
+</p:notes>
+</file>
+
 <file path=ppt/slideLayouts/slideLayout1.xml><?xml version="1.0" encoding="utf-8"?>
 <p:sldLayout xmlns:a="http://schemas.openxmlformats.org/drawingml/2006/main" xmlns:r="http://schemas.openxmlformats.org/officeDocument/2006/relationships" xmlns:p="http://schemas.openxmlformats.org/presentationml/2006/main" type="title" preserve="1">
   <p:cSld name="Title Slide">
@@ -6808,7 +6898,7 @@
           <a:p>
             <a:fld id="{404C2AC6-8E4F-4B84-9A34-CF7CEE623BF0}" type="datetimeFigureOut">
               <a:rPr lang="en-US" smtClean="0"/>
-              <a:t>4/15/2020</a:t>
+              <a:t>5/6/2020</a:t>
             </a:fld>
             <a:endParaRPr lang="en-US"/>
           </a:p>
@@ -7006,7 +7096,7 @@
           <a:p>
             <a:fld id="{404C2AC6-8E4F-4B84-9A34-CF7CEE623BF0}" type="datetimeFigureOut">
               <a:rPr lang="en-US" smtClean="0"/>
-              <a:t>4/15/2020</a:t>
+              <a:t>5/6/2020</a:t>
             </a:fld>
             <a:endParaRPr lang="en-US"/>
           </a:p>
@@ -7214,7 +7304,7 @@
           <a:p>
             <a:fld id="{404C2AC6-8E4F-4B84-9A34-CF7CEE623BF0}" type="datetimeFigureOut">
               <a:rPr lang="en-US" smtClean="0"/>
-              <a:t>4/15/2020</a:t>
+              <a:t>5/6/2020</a:t>
             </a:fld>
             <a:endParaRPr lang="en-US"/>
           </a:p>
@@ -7412,7 +7502,7 @@
           <a:p>
             <a:fld id="{404C2AC6-8E4F-4B84-9A34-CF7CEE623BF0}" type="datetimeFigureOut">
               <a:rPr lang="en-US" smtClean="0"/>
-              <a:t>4/15/2020</a:t>
+              <a:t>5/6/2020</a:t>
             </a:fld>
             <a:endParaRPr lang="en-US"/>
           </a:p>
@@ -7687,7 +7777,7 @@
           <a:p>
             <a:fld id="{404C2AC6-8E4F-4B84-9A34-CF7CEE623BF0}" type="datetimeFigureOut">
               <a:rPr lang="en-US" smtClean="0"/>
-              <a:t>4/15/2020</a:t>
+              <a:t>5/6/2020</a:t>
             </a:fld>
             <a:endParaRPr lang="en-US"/>
           </a:p>
@@ -7952,7 +8042,7 @@
           <a:p>
             <a:fld id="{404C2AC6-8E4F-4B84-9A34-CF7CEE623BF0}" type="datetimeFigureOut">
               <a:rPr lang="en-US" smtClean="0"/>
-              <a:t>4/15/2020</a:t>
+              <a:t>5/6/2020</a:t>
             </a:fld>
             <a:endParaRPr lang="en-US"/>
           </a:p>
@@ -8364,7 +8454,7 @@
           <a:p>
             <a:fld id="{404C2AC6-8E4F-4B84-9A34-CF7CEE623BF0}" type="datetimeFigureOut">
               <a:rPr lang="en-US" smtClean="0"/>
-              <a:t>4/15/2020</a:t>
+              <a:t>5/6/2020</a:t>
             </a:fld>
             <a:endParaRPr lang="en-US"/>
           </a:p>
@@ -8505,7 +8595,7 @@
           <a:p>
             <a:fld id="{404C2AC6-8E4F-4B84-9A34-CF7CEE623BF0}" type="datetimeFigureOut">
               <a:rPr lang="en-US" smtClean="0"/>
-              <a:t>4/15/2020</a:t>
+              <a:t>5/6/2020</a:t>
             </a:fld>
             <a:endParaRPr lang="en-US"/>
           </a:p>
@@ -8618,7 +8708,7 @@
           <a:p>
             <a:fld id="{404C2AC6-8E4F-4B84-9A34-CF7CEE623BF0}" type="datetimeFigureOut">
               <a:rPr lang="en-US" smtClean="0"/>
-              <a:t>4/15/2020</a:t>
+              <a:t>5/6/2020</a:t>
             </a:fld>
             <a:endParaRPr lang="en-US"/>
           </a:p>
@@ -8929,7 +9019,7 @@
           <a:p>
             <a:fld id="{404C2AC6-8E4F-4B84-9A34-CF7CEE623BF0}" type="datetimeFigureOut">
               <a:rPr lang="en-US" smtClean="0"/>
-              <a:t>4/15/2020</a:t>
+              <a:t>5/6/2020</a:t>
             </a:fld>
             <a:endParaRPr lang="en-US"/>
           </a:p>
@@ -9217,7 +9307,7 @@
           <a:p>
             <a:fld id="{404C2AC6-8E4F-4B84-9A34-CF7CEE623BF0}" type="datetimeFigureOut">
               <a:rPr lang="en-US" smtClean="0"/>
-              <a:t>4/15/2020</a:t>
+              <a:t>5/6/2020</a:t>
             </a:fld>
             <a:endParaRPr lang="en-US"/>
           </a:p>
@@ -9463,7 +9553,7 @@
           <a:p>
             <a:fld id="{404C2AC6-8E4F-4B84-9A34-CF7CEE623BF0}" type="datetimeFigureOut">
               <a:rPr lang="en-US" smtClean="0"/>
-              <a:t>4/15/2020</a:t>
+              <a:t>5/6/2020</a:t>
             </a:fld>
             <a:endParaRPr lang="en-US"/>
           </a:p>
@@ -11501,6 +11591,589 @@
   <p:clrMapOvr>
     <a:masterClrMapping/>
   </p:clrMapOvr>
+</p:sld>
+</file>
+
+<file path=ppt/slides/slide6.xml><?xml version="1.0" encoding="utf-8"?>
+<p:sld xmlns:a="http://schemas.openxmlformats.org/drawingml/2006/main" xmlns:r="http://schemas.openxmlformats.org/officeDocument/2006/relationships" xmlns:p="http://schemas.openxmlformats.org/presentationml/2006/main">
+  <p:cSld>
+    <p:spTree>
+      <p:nvGrpSpPr>
+        <p:cNvPr id="1" name=""/>
+        <p:cNvGrpSpPr/>
+        <p:nvPr/>
+      </p:nvGrpSpPr>
+      <p:grpSpPr>
+        <a:xfrm>
+          <a:off x="0" y="0"/>
+          <a:ext cx="0" cy="0"/>
+          <a:chOff x="0" y="0"/>
+          <a:chExt cx="0" cy="0"/>
+        </a:xfrm>
+      </p:grpSpPr>
+      <p:pic>
+        <p:nvPicPr>
+          <p:cNvPr id="4" name="Content Placeholder 3">
+            <a:extLst>
+              <a:ext uri="{FF2B5EF4-FFF2-40B4-BE49-F238E27FC236}">
+                <a16:creationId xmlns:a16="http://schemas.microsoft.com/office/drawing/2014/main" id="{7D8EA4F5-0AD2-487F-9E5E-BA7E1B34DA3F}"/>
+              </a:ext>
+            </a:extLst>
+          </p:cNvPr>
+          <p:cNvPicPr>
+            <a:picLocks noGrp="1" noChangeAspect="1"/>
+          </p:cNvPicPr>
+          <p:nvPr>
+            <p:ph idx="1"/>
+          </p:nvPr>
+        </p:nvPicPr>
+        <p:blipFill rotWithShape="1">
+          <a:blip r:embed="rId3"/>
+          <a:srcRect l="6507" t="34392" r="43162" b="5590"/>
+          <a:stretch/>
+        </p:blipFill>
+        <p:spPr>
+          <a:xfrm>
+            <a:off x="1381468" y="644686"/>
+            <a:ext cx="9232272" cy="5335098"/>
+          </a:xfrm>
+          <a:prstGeom prst="rect">
+            <a:avLst/>
+          </a:prstGeom>
+        </p:spPr>
+      </p:pic>
+      <p:sp>
+        <p:nvSpPr>
+          <p:cNvPr id="2" name="Title 1">
+            <a:extLst>
+              <a:ext uri="{FF2B5EF4-FFF2-40B4-BE49-F238E27FC236}">
+                <a16:creationId xmlns:a16="http://schemas.microsoft.com/office/drawing/2014/main" id="{A32258DC-A808-4918-BE7D-58CAFCAC9606}"/>
+              </a:ext>
+            </a:extLst>
+          </p:cNvPr>
+          <p:cNvSpPr>
+            <a:spLocks noGrp="1"/>
+          </p:cNvSpPr>
+          <p:nvPr>
+            <p:ph type="title"/>
+          </p:nvPr>
+        </p:nvSpPr>
+        <p:spPr>
+          <a:xfrm>
+            <a:off x="2077957" y="2536905"/>
+            <a:ext cx="8036085" cy="1325563"/>
+          </a:xfrm>
+        </p:spPr>
+        <p:txBody>
+          <a:bodyPr>
+            <a:normAutofit/>
+          </a:bodyPr>
+          <a:lstStyle/>
+          <a:p>
+            <a:r>
+              <a:rPr lang="en-US" dirty="0">
+                <a:solidFill>
+                  <a:schemeClr val="bg1"/>
+                </a:solidFill>
+              </a:rPr>
+              <a:t>Digging into Asynchronous Node.js</a:t>
+            </a:r>
+          </a:p>
+        </p:txBody>
+      </p:sp>
+      <p:sp>
+        <p:nvSpPr>
+          <p:cNvPr id="5" name="TextBox 4">
+            <a:extLst>
+              <a:ext uri="{FF2B5EF4-FFF2-40B4-BE49-F238E27FC236}">
+                <a16:creationId xmlns:a16="http://schemas.microsoft.com/office/drawing/2014/main" id="{8246228A-1FD1-4AF6-B3C5-9382F7D3724A}"/>
+              </a:ext>
+            </a:extLst>
+          </p:cNvPr>
+          <p:cNvSpPr txBox="1"/>
+          <p:nvPr/>
+        </p:nvSpPr>
+        <p:spPr>
+          <a:xfrm>
+            <a:off x="5292062" y="3536307"/>
+            <a:ext cx="3265253" cy="369332"/>
+          </a:xfrm>
+          <a:prstGeom prst="rect">
+            <a:avLst/>
+          </a:prstGeom>
+          <a:noFill/>
+        </p:spPr>
+        <p:txBody>
+          <a:bodyPr wrap="none" rtlCol="0">
+            <a:spAutoFit/>
+          </a:bodyPr>
+          <a:lstStyle/>
+          <a:p>
+            <a:r>
+              <a:rPr lang="en-US" dirty="0">
+                <a:solidFill>
+                  <a:schemeClr val="bg1"/>
+                </a:solidFill>
+              </a:rPr>
+              <a:t>Notice the order of operations …</a:t>
+            </a:r>
+          </a:p>
+        </p:txBody>
+      </p:sp>
+      <p:cxnSp>
+        <p:nvCxnSpPr>
+          <p:cNvPr id="7" name="Connector: Elbow 6">
+            <a:extLst>
+              <a:ext uri="{FF2B5EF4-FFF2-40B4-BE49-F238E27FC236}">
+                <a16:creationId xmlns:a16="http://schemas.microsoft.com/office/drawing/2014/main" id="{9EE686BA-AFF7-4B3B-ADC6-FB25F3D64ACE}"/>
+              </a:ext>
+            </a:extLst>
+          </p:cNvPr>
+          <p:cNvCxnSpPr>
+            <a:cxnSpLocks/>
+          </p:cNvCxnSpPr>
+          <p:nvPr/>
+        </p:nvCxnSpPr>
+        <p:spPr>
+          <a:xfrm rot="10800000" flipV="1">
+            <a:off x="3420777" y="3710226"/>
+            <a:ext cx="1743280" cy="1706398"/>
+          </a:xfrm>
+          <a:prstGeom prst="bentConnector3">
+            <a:avLst/>
+          </a:prstGeom>
+          <a:ln w="19050">
+            <a:solidFill>
+              <a:schemeClr val="bg1"/>
+            </a:solidFill>
+            <a:tailEnd type="triangle"/>
+          </a:ln>
+        </p:spPr>
+        <p:style>
+          <a:lnRef idx="1">
+            <a:schemeClr val="accent1"/>
+          </a:lnRef>
+          <a:fillRef idx="0">
+            <a:schemeClr val="accent1"/>
+          </a:fillRef>
+          <a:effectRef idx="0">
+            <a:schemeClr val="accent1"/>
+          </a:effectRef>
+          <a:fontRef idx="minor">
+            <a:schemeClr val="tx1"/>
+          </a:fontRef>
+        </p:style>
+      </p:cxnSp>
+      <p:sp>
+        <p:nvSpPr>
+          <p:cNvPr id="9" name="TextBox 8">
+            <a:extLst>
+              <a:ext uri="{FF2B5EF4-FFF2-40B4-BE49-F238E27FC236}">
+                <a16:creationId xmlns:a16="http://schemas.microsoft.com/office/drawing/2014/main" id="{FF8A530D-ECAA-425B-9A47-41D693E90B55}"/>
+              </a:ext>
+            </a:extLst>
+          </p:cNvPr>
+          <p:cNvSpPr txBox="1"/>
+          <p:nvPr/>
+        </p:nvSpPr>
+        <p:spPr>
+          <a:xfrm>
+            <a:off x="5292062" y="3959910"/>
+            <a:ext cx="4372607" cy="369332"/>
+          </a:xfrm>
+          <a:prstGeom prst="rect">
+            <a:avLst/>
+          </a:prstGeom>
+          <a:noFill/>
+        </p:spPr>
+        <p:txBody>
+          <a:bodyPr wrap="none" rtlCol="0">
+            <a:spAutoFit/>
+          </a:bodyPr>
+          <a:lstStyle/>
+          <a:p>
+            <a:r>
+              <a:rPr lang="en-US" dirty="0">
+                <a:solidFill>
+                  <a:schemeClr val="bg1"/>
+                </a:solidFill>
+              </a:rPr>
+              <a:t>Not what we expect. Why does this happen?</a:t>
+            </a:r>
+          </a:p>
+        </p:txBody>
+      </p:sp>
+      <p:sp>
+        <p:nvSpPr>
+          <p:cNvPr id="11" name="TextBox 10">
+            <a:extLst>
+              <a:ext uri="{FF2B5EF4-FFF2-40B4-BE49-F238E27FC236}">
+                <a16:creationId xmlns:a16="http://schemas.microsoft.com/office/drawing/2014/main" id="{BD704AA7-9669-40C1-9A82-8CFE94FBC775}"/>
+              </a:ext>
+            </a:extLst>
+          </p:cNvPr>
+          <p:cNvSpPr txBox="1"/>
+          <p:nvPr/>
+        </p:nvSpPr>
+        <p:spPr>
+          <a:xfrm>
+            <a:off x="5423630" y="4292299"/>
+            <a:ext cx="4821980" cy="461665"/>
+          </a:xfrm>
+          <a:prstGeom prst="rect">
+            <a:avLst/>
+          </a:prstGeom>
+          <a:noFill/>
+        </p:spPr>
+        <p:txBody>
+          <a:bodyPr wrap="square" rtlCol="0">
+            <a:spAutoFit/>
+          </a:bodyPr>
+          <a:lstStyle/>
+          <a:p>
+            <a:r>
+              <a:rPr lang="en-US" sz="1200" dirty="0">
+                <a:solidFill>
+                  <a:schemeClr val="bg1"/>
+                </a:solidFill>
+              </a:rPr>
+              <a:t>- Node uses other threads in C++ to run asynchronous code in the background while continuing through each function call in the call stack.</a:t>
+            </a:r>
+          </a:p>
+        </p:txBody>
+      </p:sp>
+      <p:sp>
+        <p:nvSpPr>
+          <p:cNvPr id="12" name="TextBox 11">
+            <a:extLst>
+              <a:ext uri="{FF2B5EF4-FFF2-40B4-BE49-F238E27FC236}">
+                <a16:creationId xmlns:a16="http://schemas.microsoft.com/office/drawing/2014/main" id="{BCFA7ADB-9E36-496F-85EF-6EA9EF28CA7A}"/>
+              </a:ext>
+            </a:extLst>
+          </p:cNvPr>
+          <p:cNvSpPr txBox="1"/>
+          <p:nvPr/>
+        </p:nvSpPr>
+        <p:spPr>
+          <a:xfrm>
+            <a:off x="5423630" y="4708947"/>
+            <a:ext cx="4821980" cy="646331"/>
+          </a:xfrm>
+          <a:prstGeom prst="rect">
+            <a:avLst/>
+          </a:prstGeom>
+          <a:noFill/>
+        </p:spPr>
+        <p:txBody>
+          <a:bodyPr wrap="square" rtlCol="0">
+            <a:spAutoFit/>
+          </a:bodyPr>
+          <a:lstStyle/>
+          <a:p>
+            <a:r>
+              <a:rPr lang="en-US" sz="1200" dirty="0">
+                <a:solidFill>
+                  <a:schemeClr val="bg1"/>
+                </a:solidFill>
+              </a:rPr>
+              <a:t>- Callback functions within the functions called, are added to an Event Loop. When the stack is empty, those callback functions are added to the main stack to be executed.</a:t>
+            </a:r>
+          </a:p>
+        </p:txBody>
+      </p:sp>
+    </p:spTree>
+    <p:extLst>
+      <p:ext uri="{BB962C8B-B14F-4D97-AF65-F5344CB8AC3E}">
+        <p14:creationId xmlns:p14="http://schemas.microsoft.com/office/powerpoint/2010/main" val="3534561792"/>
+      </p:ext>
+    </p:extLst>
+  </p:cSld>
+  <p:clrMapOvr>
+    <a:masterClrMapping/>
+  </p:clrMapOvr>
+  <p:timing>
+    <p:tnLst>
+      <p:par>
+        <p:cTn id="1" dur="indefinite" restart="never" nodeType="tmRoot">
+          <p:childTnLst>
+            <p:seq concurrent="1" nextAc="seek">
+              <p:cTn id="2" dur="indefinite" nodeType="mainSeq">
+                <p:childTnLst>
+                  <p:par>
+                    <p:cTn id="3" fill="hold">
+                      <p:stCondLst>
+                        <p:cond delay="indefinite"/>
+                      </p:stCondLst>
+                      <p:childTnLst>
+                        <p:par>
+                          <p:cTn id="4" fill="hold">
+                            <p:stCondLst>
+                              <p:cond delay="0"/>
+                            </p:stCondLst>
+                            <p:childTnLst>
+                              <p:par>
+                                <p:cTn id="5" presetID="10" presetClass="entr" presetSubtype="0" fill="hold" grpId="0" nodeType="clickEffect">
+                                  <p:stCondLst>
+                                    <p:cond delay="0"/>
+                                  </p:stCondLst>
+                                  <p:childTnLst>
+                                    <p:set>
+                                      <p:cBhvr>
+                                        <p:cTn id="6" dur="1" fill="hold">
+                                          <p:stCondLst>
+                                            <p:cond delay="0"/>
+                                          </p:stCondLst>
+                                        </p:cTn>
+                                        <p:tgtEl>
+                                          <p:spTgt spid="5"/>
+                                        </p:tgtEl>
+                                        <p:attrNameLst>
+                                          <p:attrName>style.visibility</p:attrName>
+                                        </p:attrNameLst>
+                                      </p:cBhvr>
+                                      <p:to>
+                                        <p:strVal val="visible"/>
+                                      </p:to>
+                                    </p:set>
+                                    <p:animEffect transition="in" filter="fade">
+                                      <p:cBhvr>
+                                        <p:cTn id="7" dur="1250"/>
+                                        <p:tgtEl>
+                                          <p:spTgt spid="5"/>
+                                        </p:tgtEl>
+                                      </p:cBhvr>
+                                    </p:animEffect>
+                                  </p:childTnLst>
+                                </p:cTn>
+                              </p:par>
+                              <p:par>
+                                <p:cTn id="8" presetID="10" presetClass="entr" presetSubtype="0" fill="hold" nodeType="withEffect">
+                                  <p:stCondLst>
+                                    <p:cond delay="0"/>
+                                  </p:stCondLst>
+                                  <p:childTnLst>
+                                    <p:set>
+                                      <p:cBhvr>
+                                        <p:cTn id="9" dur="1" fill="hold">
+                                          <p:stCondLst>
+                                            <p:cond delay="0"/>
+                                          </p:stCondLst>
+                                        </p:cTn>
+                                        <p:tgtEl>
+                                          <p:spTgt spid="7"/>
+                                        </p:tgtEl>
+                                        <p:attrNameLst>
+                                          <p:attrName>style.visibility</p:attrName>
+                                        </p:attrNameLst>
+                                      </p:cBhvr>
+                                      <p:to>
+                                        <p:strVal val="visible"/>
+                                      </p:to>
+                                    </p:set>
+                                    <p:animEffect transition="in" filter="fade">
+                                      <p:cBhvr>
+                                        <p:cTn id="10" dur="1250"/>
+                                        <p:tgtEl>
+                                          <p:spTgt spid="7"/>
+                                        </p:tgtEl>
+                                      </p:cBhvr>
+                                    </p:animEffect>
+                                  </p:childTnLst>
+                                </p:cTn>
+                              </p:par>
+                            </p:childTnLst>
+                          </p:cTn>
+                        </p:par>
+                      </p:childTnLst>
+                    </p:cTn>
+                  </p:par>
+                  <p:par>
+                    <p:cTn id="11" fill="hold">
+                      <p:stCondLst>
+                        <p:cond delay="indefinite"/>
+                      </p:stCondLst>
+                      <p:childTnLst>
+                        <p:par>
+                          <p:cTn id="12" fill="hold">
+                            <p:stCondLst>
+                              <p:cond delay="0"/>
+                            </p:stCondLst>
+                            <p:childTnLst>
+                              <p:par>
+                                <p:cTn id="13" presetID="10" presetClass="entr" presetSubtype="0" fill="hold" grpId="0" nodeType="clickEffect">
+                                  <p:stCondLst>
+                                    <p:cond delay="0"/>
+                                  </p:stCondLst>
+                                  <p:childTnLst>
+                                    <p:set>
+                                      <p:cBhvr>
+                                        <p:cTn id="14" dur="1" fill="hold">
+                                          <p:stCondLst>
+                                            <p:cond delay="0"/>
+                                          </p:stCondLst>
+                                        </p:cTn>
+                                        <p:tgtEl>
+                                          <p:spTgt spid="9"/>
+                                        </p:tgtEl>
+                                        <p:attrNameLst>
+                                          <p:attrName>style.visibility</p:attrName>
+                                        </p:attrNameLst>
+                                      </p:cBhvr>
+                                      <p:to>
+                                        <p:strVal val="visible"/>
+                                      </p:to>
+                                    </p:set>
+                                    <p:animEffect transition="in" filter="fade">
+                                      <p:cBhvr>
+                                        <p:cTn id="15" dur="1250"/>
+                                        <p:tgtEl>
+                                          <p:spTgt spid="9"/>
+                                        </p:tgtEl>
+                                      </p:cBhvr>
+                                    </p:animEffect>
+                                  </p:childTnLst>
+                                </p:cTn>
+                              </p:par>
+                            </p:childTnLst>
+                          </p:cTn>
+                        </p:par>
+                      </p:childTnLst>
+                    </p:cTn>
+                  </p:par>
+                  <p:par>
+                    <p:cTn id="16" fill="hold">
+                      <p:stCondLst>
+                        <p:cond delay="indefinite"/>
+                      </p:stCondLst>
+                      <p:childTnLst>
+                        <p:par>
+                          <p:cTn id="17" fill="hold">
+                            <p:stCondLst>
+                              <p:cond delay="0"/>
+                            </p:stCondLst>
+                            <p:childTnLst>
+                              <p:par>
+                                <p:cTn id="18" presetID="10" presetClass="entr" presetSubtype="0" fill="hold" grpId="0" nodeType="clickEffect">
+                                  <p:stCondLst>
+                                    <p:cond delay="0"/>
+                                  </p:stCondLst>
+                                  <p:childTnLst>
+                                    <p:set>
+                                      <p:cBhvr>
+                                        <p:cTn id="19" dur="1" fill="hold">
+                                          <p:stCondLst>
+                                            <p:cond delay="0"/>
+                                          </p:stCondLst>
+                                        </p:cTn>
+                                        <p:tgtEl>
+                                          <p:spTgt spid="11"/>
+                                        </p:tgtEl>
+                                        <p:attrNameLst>
+                                          <p:attrName>style.visibility</p:attrName>
+                                        </p:attrNameLst>
+                                      </p:cBhvr>
+                                      <p:to>
+                                        <p:strVal val="visible"/>
+                                      </p:to>
+                                    </p:set>
+                                    <p:animEffect transition="in" filter="fade">
+                                      <p:cBhvr>
+                                        <p:cTn id="20" dur="1250"/>
+                                        <p:tgtEl>
+                                          <p:spTgt spid="11"/>
+                                        </p:tgtEl>
+                                      </p:cBhvr>
+                                    </p:animEffect>
+                                  </p:childTnLst>
+                                </p:cTn>
+                              </p:par>
+                            </p:childTnLst>
+                          </p:cTn>
+                        </p:par>
+                      </p:childTnLst>
+                    </p:cTn>
+                  </p:par>
+                  <p:par>
+                    <p:cTn id="21" fill="hold">
+                      <p:stCondLst>
+                        <p:cond delay="indefinite"/>
+                      </p:stCondLst>
+                      <p:childTnLst>
+                        <p:par>
+                          <p:cTn id="22" fill="hold">
+                            <p:stCondLst>
+                              <p:cond delay="0"/>
+                            </p:stCondLst>
+                            <p:childTnLst>
+                              <p:par>
+                                <p:cTn id="23" presetID="10" presetClass="entr" presetSubtype="0" fill="hold" grpId="0" nodeType="clickEffect">
+                                  <p:stCondLst>
+                                    <p:cond delay="0"/>
+                                  </p:stCondLst>
+                                  <p:childTnLst>
+                                    <p:set>
+                                      <p:cBhvr>
+                                        <p:cTn id="24" dur="1" fill="hold">
+                                          <p:stCondLst>
+                                            <p:cond delay="0"/>
+                                          </p:stCondLst>
+                                        </p:cTn>
+                                        <p:tgtEl>
+                                          <p:spTgt spid="12"/>
+                                        </p:tgtEl>
+                                        <p:attrNameLst>
+                                          <p:attrName>style.visibility</p:attrName>
+                                        </p:attrNameLst>
+                                      </p:cBhvr>
+                                      <p:to>
+                                        <p:strVal val="visible"/>
+                                      </p:to>
+                                    </p:set>
+                                    <p:animEffect transition="in" filter="fade">
+                                      <p:cBhvr>
+                                        <p:cTn id="25" dur="1250"/>
+                                        <p:tgtEl>
+                                          <p:spTgt spid="12"/>
+                                        </p:tgtEl>
+                                      </p:cBhvr>
+                                    </p:animEffect>
+                                  </p:childTnLst>
+                                </p:cTn>
+                              </p:par>
+                            </p:childTnLst>
+                          </p:cTn>
+                        </p:par>
+                      </p:childTnLst>
+                    </p:cTn>
+                  </p:par>
+                </p:childTnLst>
+              </p:cTn>
+              <p:prevCondLst>
+                <p:cond evt="onPrev" delay="0">
+                  <p:tgtEl>
+                    <p:sldTgt/>
+                  </p:tgtEl>
+                </p:cond>
+              </p:prevCondLst>
+              <p:nextCondLst>
+                <p:cond evt="onNext" delay="0">
+                  <p:tgtEl>
+                    <p:sldTgt/>
+                  </p:tgtEl>
+                </p:cond>
+              </p:nextCondLst>
+            </p:seq>
+          </p:childTnLst>
+        </p:cTn>
+      </p:par>
+    </p:tnLst>
+    <p:bldLst>
+      <p:bldP spid="5" grpId="0"/>
+      <p:bldP spid="9" grpId="0"/>
+      <p:bldP spid="11" grpId="0"/>
+      <p:bldP spid="12" grpId="0"/>
+    </p:bldLst>
+  </p:timing>
 </p:sld>
 </file>
 

</xml_diff>